<commit_message>
Modificada a imagem nanoGPTModel.
</commit_message>
<xml_diff>
--- a/GPT_model.pptx
+++ b/GPT_model.pptx
@@ -243,7 +243,7 @@
           <a:p>
             <a:fld id="{340F23B5-8C4B-48DD-BF6E-763AF153F3AE}" type="datetimeFigureOut">
               <a:rPr lang="pt-BR" smtClean="0"/>
-              <a:t>10/06/2023</a:t>
+              <a:t>13/06/2023</a:t>
             </a:fld>
             <a:endParaRPr lang="pt-BR"/>
           </a:p>
@@ -413,7 +413,7 @@
           <a:p>
             <a:fld id="{340F23B5-8C4B-48DD-BF6E-763AF153F3AE}" type="datetimeFigureOut">
               <a:rPr lang="pt-BR" smtClean="0"/>
-              <a:t>10/06/2023</a:t>
+              <a:t>13/06/2023</a:t>
             </a:fld>
             <a:endParaRPr lang="pt-BR"/>
           </a:p>
@@ -593,7 +593,7 @@
           <a:p>
             <a:fld id="{340F23B5-8C4B-48DD-BF6E-763AF153F3AE}" type="datetimeFigureOut">
               <a:rPr lang="pt-BR" smtClean="0"/>
-              <a:t>10/06/2023</a:t>
+              <a:t>13/06/2023</a:t>
             </a:fld>
             <a:endParaRPr lang="pt-BR"/>
           </a:p>
@@ -763,7 +763,7 @@
           <a:p>
             <a:fld id="{340F23B5-8C4B-48DD-BF6E-763AF153F3AE}" type="datetimeFigureOut">
               <a:rPr lang="pt-BR" smtClean="0"/>
-              <a:t>10/06/2023</a:t>
+              <a:t>13/06/2023</a:t>
             </a:fld>
             <a:endParaRPr lang="pt-BR"/>
           </a:p>
@@ -1009,7 +1009,7 @@
           <a:p>
             <a:fld id="{340F23B5-8C4B-48DD-BF6E-763AF153F3AE}" type="datetimeFigureOut">
               <a:rPr lang="pt-BR" smtClean="0"/>
-              <a:t>10/06/2023</a:t>
+              <a:t>13/06/2023</a:t>
             </a:fld>
             <a:endParaRPr lang="pt-BR"/>
           </a:p>
@@ -1241,7 +1241,7 @@
           <a:p>
             <a:fld id="{340F23B5-8C4B-48DD-BF6E-763AF153F3AE}" type="datetimeFigureOut">
               <a:rPr lang="pt-BR" smtClean="0"/>
-              <a:t>10/06/2023</a:t>
+              <a:t>13/06/2023</a:t>
             </a:fld>
             <a:endParaRPr lang="pt-BR"/>
           </a:p>
@@ -1608,7 +1608,7 @@
           <a:p>
             <a:fld id="{340F23B5-8C4B-48DD-BF6E-763AF153F3AE}" type="datetimeFigureOut">
               <a:rPr lang="pt-BR" smtClean="0"/>
-              <a:t>10/06/2023</a:t>
+              <a:t>13/06/2023</a:t>
             </a:fld>
             <a:endParaRPr lang="pt-BR"/>
           </a:p>
@@ -1726,7 +1726,7 @@
           <a:p>
             <a:fld id="{340F23B5-8C4B-48DD-BF6E-763AF153F3AE}" type="datetimeFigureOut">
               <a:rPr lang="pt-BR" smtClean="0"/>
-              <a:t>10/06/2023</a:t>
+              <a:t>13/06/2023</a:t>
             </a:fld>
             <a:endParaRPr lang="pt-BR"/>
           </a:p>
@@ -1821,7 +1821,7 @@
           <a:p>
             <a:fld id="{340F23B5-8C4B-48DD-BF6E-763AF153F3AE}" type="datetimeFigureOut">
               <a:rPr lang="pt-BR" smtClean="0"/>
-              <a:t>10/06/2023</a:t>
+              <a:t>13/06/2023</a:t>
             </a:fld>
             <a:endParaRPr lang="pt-BR"/>
           </a:p>
@@ -2098,7 +2098,7 @@
           <a:p>
             <a:fld id="{340F23B5-8C4B-48DD-BF6E-763AF153F3AE}" type="datetimeFigureOut">
               <a:rPr lang="pt-BR" smtClean="0"/>
-              <a:t>10/06/2023</a:t>
+              <a:t>13/06/2023</a:t>
             </a:fld>
             <a:endParaRPr lang="pt-BR"/>
           </a:p>
@@ -2351,7 +2351,7 @@
           <a:p>
             <a:fld id="{340F23B5-8C4B-48DD-BF6E-763AF153F3AE}" type="datetimeFigureOut">
               <a:rPr lang="pt-BR" smtClean="0"/>
-              <a:t>10/06/2023</a:t>
+              <a:t>13/06/2023</a:t>
             </a:fld>
             <a:endParaRPr lang="pt-BR"/>
           </a:p>
@@ -2564,7 +2564,7 @@
           <a:p>
             <a:fld id="{340F23B5-8C4B-48DD-BF6E-763AF153F3AE}" type="datetimeFigureOut">
               <a:rPr lang="pt-BR" smtClean="0"/>
-              <a:t>10/06/2023</a:t>
+              <a:t>13/06/2023</a:t>
             </a:fld>
             <a:endParaRPr lang="pt-BR"/>
           </a:p>
@@ -3332,7 +3332,7 @@
         <p:spPr>
           <a:xfrm>
             <a:off x="10539166" y="2945253"/>
-            <a:ext cx="948145" cy="230832"/>
+            <a:ext cx="1168580" cy="276999"/>
           </a:xfrm>
           <a:prstGeom prst="rect">
             <a:avLst/>
@@ -3346,7 +3346,7 @@
           <a:lstStyle/>
           <a:p>
             <a:r>
-              <a:rPr lang="pt-BR" sz="900" b="1" i="1" dirty="0" err="1" smtClean="0">
+              <a:rPr lang="pt-BR" sz="1200" b="1" i="1" dirty="0" err="1" smtClean="0">
                 <a:solidFill>
                   <a:srgbClr val="FF0000"/>
                 </a:solidFill>
@@ -3354,7 +3354,7 @@
               <a:t>Block</a:t>
             </a:r>
             <a:r>
-              <a:rPr lang="pt-BR" sz="900" b="1" i="1" dirty="0" smtClean="0">
+              <a:rPr lang="pt-BR" sz="1200" b="1" i="1" dirty="0" smtClean="0">
                 <a:solidFill>
                   <a:srgbClr val="FF0000"/>
                 </a:solidFill>
@@ -3362,7 +3362,7 @@
               <a:t> (6 </a:t>
             </a:r>
             <a:r>
-              <a:rPr lang="pt-BR" sz="900" b="1" i="1" dirty="0" err="1" smtClean="0">
+              <a:rPr lang="pt-BR" sz="1200" b="1" i="1" dirty="0" err="1" smtClean="0">
                 <a:solidFill>
                   <a:srgbClr val="FF0000"/>
                 </a:solidFill>
@@ -3370,14 +3370,14 @@
               <a:t>layers</a:t>
             </a:r>
             <a:r>
-              <a:rPr lang="pt-BR" sz="900" b="1" i="1" dirty="0" smtClean="0">
+              <a:rPr lang="pt-BR" sz="1200" b="1" i="1" dirty="0" smtClean="0">
                 <a:solidFill>
                   <a:srgbClr val="FF0000"/>
                 </a:solidFill>
               </a:rPr>
               <a:t>)</a:t>
             </a:r>
-            <a:endParaRPr lang="pt-BR" sz="900" b="1" i="1" dirty="0">
+            <a:endParaRPr lang="pt-BR" sz="1200" b="1" i="1" dirty="0">
               <a:solidFill>
                 <a:srgbClr val="FF0000"/>
               </a:solidFill>
@@ -3482,7 +3482,7 @@
         <p:spPr>
           <a:xfrm>
             <a:off x="8562323" y="5373746"/>
-            <a:ext cx="1884600" cy="461665"/>
+            <a:ext cx="1884600" cy="584775"/>
           </a:xfrm>
           <a:prstGeom prst="rect">
             <a:avLst/>
@@ -3507,7 +3507,7 @@
           </a:p>
           <a:p>
             <a:r>
-              <a:rPr lang="pt-BR" sz="700" dirty="0" err="1">
+              <a:rPr lang="pt-BR" sz="800" dirty="0" err="1">
                 <a:solidFill>
                   <a:schemeClr val="accent6">
                     <a:lumMod val="50000"/>
@@ -3517,7 +3517,7 @@
               <a:t>w</a:t>
             </a:r>
             <a:r>
-              <a:rPr lang="pt-BR" sz="700" dirty="0" err="1" smtClean="0">
+              <a:rPr lang="pt-BR" sz="800" dirty="0" err="1" smtClean="0">
                 <a:solidFill>
                   <a:schemeClr val="accent6">
                     <a:lumMod val="50000"/>
@@ -3527,7 +3527,7 @@
               <a:t>te</a:t>
             </a:r>
             <a:r>
-              <a:rPr lang="pt-BR" sz="700" dirty="0" smtClean="0">
+              <a:rPr lang="pt-BR" sz="800" dirty="0" smtClean="0">
                 <a:solidFill>
                   <a:schemeClr val="accent6">
                     <a:lumMod val="50000"/>
@@ -3537,7 +3537,7 @@
               <a:t> = </a:t>
             </a:r>
             <a:r>
-              <a:rPr lang="pt-BR" sz="700" dirty="0" err="1" smtClean="0">
+              <a:rPr lang="pt-BR" sz="800" dirty="0" err="1" smtClean="0">
                 <a:solidFill>
                   <a:schemeClr val="accent6">
                     <a:lumMod val="50000"/>
@@ -3547,7 +3547,7 @@
               <a:t>nn.Embedding</a:t>
             </a:r>
             <a:r>
-              <a:rPr lang="pt-BR" sz="700" dirty="0" smtClean="0">
+              <a:rPr lang="pt-BR" sz="800" dirty="0" smtClean="0">
                 <a:solidFill>
                   <a:schemeClr val="accent6">
                     <a:lumMod val="50000"/>
@@ -3557,7 +3557,7 @@
               <a:t>(</a:t>
             </a:r>
             <a:r>
-              <a:rPr lang="pt-BR" sz="700" dirty="0" err="1" smtClean="0">
+              <a:rPr lang="pt-BR" sz="800" dirty="0" err="1" smtClean="0">
                 <a:solidFill>
                   <a:schemeClr val="accent6">
                     <a:lumMod val="50000"/>
@@ -3567,7 +3567,7 @@
               <a:t>vocab_size</a:t>
             </a:r>
             <a:r>
-              <a:rPr lang="pt-BR" sz="700" dirty="0" smtClean="0">
+              <a:rPr lang="pt-BR" sz="800" dirty="0" smtClean="0">
                 <a:solidFill>
                   <a:schemeClr val="accent6">
                     <a:lumMod val="50000"/>
@@ -4407,44 +4407,6 @@
           </a:p>
         </p:txBody>
       </p:sp>
-      <p:sp>
-        <p:nvSpPr>
-          <p:cNvPr id="62" name="CaixaDeTexto 61"/>
-          <p:cNvSpPr txBox="1"/>
-          <p:nvPr/>
-        </p:nvSpPr>
-        <p:spPr>
-          <a:xfrm>
-            <a:off x="9106155" y="-33928"/>
-            <a:ext cx="963149" cy="215444"/>
-          </a:xfrm>
-          <a:prstGeom prst="rect">
-            <a:avLst/>
-          </a:prstGeom>
-          <a:noFill/>
-        </p:spPr>
-        <p:txBody>
-          <a:bodyPr wrap="square" rtlCol="0">
-            <a:spAutoFit/>
-          </a:bodyPr>
-          <a:lstStyle/>
-          <a:p>
-            <a:r>
-              <a:rPr lang="pt-BR" sz="800" dirty="0" smtClean="0"/>
-              <a:t>Next </a:t>
-            </a:r>
-            <a:r>
-              <a:rPr lang="pt-BR" sz="800" dirty="0" err="1" smtClean="0"/>
-              <a:t>token</a:t>
-            </a:r>
-            <a:r>
-              <a:rPr lang="pt-BR" sz="800" dirty="0" smtClean="0"/>
-              <a:t>(char)</a:t>
-            </a:r>
-            <a:endParaRPr lang="pt-BR" sz="800" dirty="0"/>
-          </a:p>
-        </p:txBody>
-      </p:sp>
       <p:cxnSp>
         <p:nvCxnSpPr>
           <p:cNvPr id="64" name="Conector de seta reta 63"/>
@@ -4594,7 +4556,7 @@
         <p:spPr>
           <a:xfrm>
             <a:off x="8810077" y="900553"/>
-            <a:ext cx="1407827" cy="461665"/>
+            <a:ext cx="1562280" cy="338554"/>
           </a:xfrm>
           <a:prstGeom prst="rect">
             <a:avLst/>
@@ -4619,7 +4581,7 @@
           </a:p>
           <a:p>
             <a:r>
-              <a:rPr lang="pt-BR" sz="700" dirty="0" err="1">
+              <a:rPr lang="pt-BR" sz="800" dirty="0" err="1">
                 <a:solidFill>
                   <a:schemeClr val="accent6">
                     <a:lumMod val="50000"/>
@@ -4629,7 +4591,7 @@
               <a:t>nn.Linear</a:t>
             </a:r>
             <a:r>
-              <a:rPr lang="pt-BR" sz="700" dirty="0" smtClean="0">
+              <a:rPr lang="pt-BR" sz="800" dirty="0" smtClean="0">
                 <a:solidFill>
                   <a:schemeClr val="accent6">
                     <a:lumMod val="50000"/>
@@ -4639,7 +4601,7 @@
               <a:t>(.</a:t>
             </a:r>
             <a:r>
-              <a:rPr lang="pt-BR" sz="700" dirty="0" err="1" smtClean="0">
+              <a:rPr lang="pt-BR" sz="800" dirty="0" err="1" smtClean="0">
                 <a:solidFill>
                   <a:schemeClr val="accent6">
                     <a:lumMod val="50000"/>
@@ -4649,7 +4611,7 @@
               <a:t>n_embd</a:t>
             </a:r>
             <a:r>
-              <a:rPr lang="pt-BR" sz="700" dirty="0" smtClean="0">
+              <a:rPr lang="pt-BR" sz="800" dirty="0" smtClean="0">
                 <a:solidFill>
                   <a:schemeClr val="accent6">
                     <a:lumMod val="50000"/>
@@ -4659,7 +4621,7 @@
               <a:t>, </a:t>
             </a:r>
             <a:r>
-              <a:rPr lang="pt-BR" sz="700" dirty="0" err="1" smtClean="0">
+              <a:rPr lang="pt-BR" sz="800" dirty="0" err="1" smtClean="0">
                 <a:solidFill>
                   <a:schemeClr val="accent6">
                     <a:lumMod val="50000"/>
@@ -4669,7 +4631,7 @@
               <a:t>vocab_size</a:t>
             </a:r>
             <a:r>
-              <a:rPr lang="pt-BR" sz="700" dirty="0" smtClean="0">
+              <a:rPr lang="pt-BR" sz="800" dirty="0" smtClean="0">
                 <a:solidFill>
                   <a:schemeClr val="accent6">
                     <a:lumMod val="50000"/>
@@ -4678,16 +4640,13 @@
               </a:rPr>
               <a:t>)</a:t>
             </a:r>
-            <a:endParaRPr lang="pt-BR" sz="700" dirty="0">
+            <a:endParaRPr lang="pt-BR" sz="800" dirty="0">
               <a:solidFill>
                 <a:schemeClr val="accent6">
                   <a:lumMod val="50000"/>
                 </a:schemeClr>
               </a:solidFill>
             </a:endParaRPr>
-          </a:p>
-          <a:p>
-            <a:endParaRPr lang="pt-BR" sz="800" dirty="0"/>
           </a:p>
         </p:txBody>
       </p:sp>
@@ -4751,7 +4710,7 @@
         <p:spPr>
           <a:xfrm>
             <a:off x="9888438" y="4843646"/>
-            <a:ext cx="1860874" cy="446276"/>
+            <a:ext cx="1947744" cy="338554"/>
           </a:xfrm>
           <a:prstGeom prst="rect">
             <a:avLst/>
@@ -4780,7 +4739,7 @@
           </a:p>
           <a:p>
             <a:r>
-              <a:rPr lang="pt-BR" sz="700" dirty="0" err="1">
+              <a:rPr lang="pt-BR" sz="800" dirty="0" err="1">
                 <a:solidFill>
                   <a:schemeClr val="accent6">
                     <a:lumMod val="50000"/>
@@ -4790,7 +4749,7 @@
               <a:t>w</a:t>
             </a:r>
             <a:r>
-              <a:rPr lang="pt-BR" sz="700" dirty="0" err="1" smtClean="0">
+              <a:rPr lang="pt-BR" sz="800" dirty="0" err="1" smtClean="0">
                 <a:solidFill>
                   <a:schemeClr val="accent6">
                     <a:lumMod val="50000"/>
@@ -4800,7 +4759,7 @@
               <a:t>pe</a:t>
             </a:r>
             <a:r>
-              <a:rPr lang="pt-BR" sz="700" dirty="0" smtClean="0">
+              <a:rPr lang="pt-BR" sz="800" dirty="0" smtClean="0">
                 <a:solidFill>
                   <a:schemeClr val="accent6">
                     <a:lumMod val="50000"/>
@@ -4810,7 +4769,7 @@
               <a:t> = </a:t>
             </a:r>
             <a:r>
-              <a:rPr lang="pt-BR" sz="700" dirty="0" err="1" smtClean="0">
+              <a:rPr lang="pt-BR" sz="800" dirty="0" err="1" smtClean="0">
                 <a:solidFill>
                   <a:schemeClr val="accent6">
                     <a:lumMod val="50000"/>
@@ -4820,7 +4779,7 @@
               <a:t>nn.Embedding</a:t>
             </a:r>
             <a:r>
-              <a:rPr lang="pt-BR" sz="700" dirty="0" smtClean="0">
+              <a:rPr lang="pt-BR" sz="800" dirty="0" smtClean="0">
                 <a:solidFill>
                   <a:schemeClr val="accent6">
                     <a:lumMod val="50000"/>
@@ -4830,7 +4789,7 @@
               <a:t>(</a:t>
             </a:r>
             <a:r>
-              <a:rPr lang="pt-BR" sz="700" dirty="0" err="1" smtClean="0">
+              <a:rPr lang="pt-BR" sz="800" dirty="0" err="1" smtClean="0">
                 <a:solidFill>
                   <a:schemeClr val="accent6">
                     <a:lumMod val="50000"/>
@@ -4840,7 +4799,7 @@
               <a:t>max_len</a:t>
             </a:r>
             <a:r>
-              <a:rPr lang="pt-BR" sz="700" dirty="0">
+              <a:rPr lang="pt-BR" sz="800" dirty="0">
                 <a:solidFill>
                   <a:schemeClr val="accent6">
                     <a:lumMod val="50000"/>
@@ -4850,7 +4809,7 @@
               <a:t>, </a:t>
             </a:r>
             <a:r>
-              <a:rPr lang="pt-BR" sz="700" dirty="0" err="1" smtClean="0">
+              <a:rPr lang="pt-BR" sz="800" dirty="0" err="1" smtClean="0">
                 <a:solidFill>
                   <a:schemeClr val="accent6">
                     <a:lumMod val="50000"/>
@@ -4860,7 +4819,7 @@
               <a:t>n_embd</a:t>
             </a:r>
             <a:r>
-              <a:rPr lang="pt-BR" sz="700" dirty="0">
+              <a:rPr lang="pt-BR" sz="800" dirty="0" smtClean="0">
                 <a:solidFill>
                   <a:schemeClr val="accent6">
                     <a:lumMod val="50000"/>
@@ -4869,9 +4828,13 @@
               </a:rPr>
               <a:t>)</a:t>
             </a:r>
-          </a:p>
-          <a:p>
-            <a:endParaRPr lang="pt-BR" sz="800" dirty="0"/>
+            <a:endParaRPr lang="pt-BR" sz="800" dirty="0">
+              <a:solidFill>
+                <a:schemeClr val="accent6">
+                  <a:lumMod val="50000"/>
+                </a:schemeClr>
+              </a:solidFill>
+            </a:endParaRPr>
           </a:p>
         </p:txBody>
       </p:sp>
@@ -4986,7 +4949,7 @@
         <p:spPr>
           <a:xfrm>
             <a:off x="5001063" y="2875114"/>
-            <a:ext cx="1927261" cy="323165"/>
+            <a:ext cx="2083479" cy="338554"/>
           </a:xfrm>
           <a:prstGeom prst="rect">
             <a:avLst/>
@@ -5007,7 +4970,7 @@
           </a:p>
           <a:p>
             <a:r>
-              <a:rPr lang="fr-FR" sz="700" dirty="0">
+              <a:rPr lang="fr-FR" sz="800" dirty="0">
                 <a:solidFill>
                   <a:schemeClr val="accent6">
                     <a:lumMod val="50000"/>
@@ -5016,7 +4979,7 @@
               </a:rPr>
               <a:t>z = z.transpose(1, 2).contiguous().view(B, T, C)</a:t>
             </a:r>
-            <a:endParaRPr lang="pt-BR" sz="700" dirty="0">
+            <a:endParaRPr lang="pt-BR" sz="800" dirty="0">
               <a:solidFill>
                 <a:schemeClr val="accent6">
                   <a:lumMod val="50000"/>
@@ -8109,8 +8072,8 @@
         </p:nvSpPr>
         <p:spPr>
           <a:xfrm>
-            <a:off x="8726864" y="6488668"/>
-            <a:ext cx="973620" cy="369332"/>
+            <a:off x="8726863" y="6488668"/>
+            <a:ext cx="1125231" cy="400110"/>
           </a:xfrm>
           <a:prstGeom prst="rect">
             <a:avLst/>
@@ -8124,14 +8087,14 @@
           <a:lstStyle/>
           <a:p>
             <a:r>
-              <a:rPr lang="pt-BR" dirty="0" err="1" smtClean="0">
+              <a:rPr lang="pt-BR" sz="2000" dirty="0" err="1" smtClean="0">
                 <a:solidFill>
                   <a:schemeClr val="accent4"/>
                 </a:solidFill>
               </a:rPr>
               <a:t>Decoder</a:t>
             </a:r>
-            <a:endParaRPr lang="pt-BR" dirty="0">
+            <a:endParaRPr lang="pt-BR" sz="2000" dirty="0">
               <a:solidFill>
                 <a:schemeClr val="accent4"/>
               </a:solidFill>
@@ -8147,7 +8110,7 @@
         </p:nvSpPr>
         <p:spPr>
           <a:xfrm rot="16200000">
-            <a:off x="8945233" y="5154061"/>
+            <a:off x="8947128" y="5200592"/>
             <a:ext cx="426427" cy="2200265"/>
           </a:xfrm>
           <a:prstGeom prst="leftBrace">
@@ -8732,7 +8695,7 @@
         <p:spPr>
           <a:xfrm>
             <a:off x="254425" y="530601"/>
-            <a:ext cx="1217249" cy="1061829"/>
+            <a:ext cx="1217249" cy="1077218"/>
           </a:xfrm>
           <a:prstGeom prst="rect">
             <a:avLst/>
@@ -8746,7 +8709,7 @@
           <a:lstStyle/>
           <a:p>
             <a:r>
-              <a:rPr lang="pt-BR" sz="900" b="1" dirty="0" err="1" smtClean="0"/>
+              <a:rPr lang="pt-BR" sz="1000" b="1" dirty="0" err="1" smtClean="0"/>
               <a:t>vocab_size</a:t>
             </a:r>
             <a:r>
@@ -8761,22 +8724,14 @@
           <a:p>
             <a:r>
               <a:rPr lang="pt-BR" sz="900" b="1" dirty="0" smtClean="0"/>
-              <a:t>B: </a:t>
-            </a:r>
+              <a:t>B: 32</a:t>
+            </a:r>
+            <a:endParaRPr lang="pt-BR" sz="900" b="1" dirty="0"/>
+          </a:p>
+          <a:p>
             <a:r>
               <a:rPr lang="pt-BR" sz="900" b="1" dirty="0" smtClean="0"/>
-              <a:t>32</a:t>
-            </a:r>
-            <a:endParaRPr lang="pt-BR" sz="900" b="1" dirty="0"/>
-          </a:p>
-          <a:p>
-            <a:r>
-              <a:rPr lang="pt-BR" sz="900" b="1" dirty="0" smtClean="0"/>
-              <a:t>T: </a:t>
-            </a:r>
-            <a:r>
-              <a:rPr lang="pt-BR" sz="900" b="1" dirty="0" smtClean="0"/>
-              <a:t>64</a:t>
+              <a:t>T: 64</a:t>
             </a:r>
           </a:p>
           <a:p>
@@ -8799,11 +8754,7 @@
           <a:p>
             <a:r>
               <a:rPr lang="pt-BR" sz="900" b="1" dirty="0" smtClean="0"/>
-              <a:t>h: </a:t>
-            </a:r>
-            <a:r>
-              <a:rPr lang="pt-BR" sz="900" b="1" dirty="0" smtClean="0"/>
-              <a:t>6</a:t>
+              <a:t>h: 6</a:t>
             </a:r>
             <a:endParaRPr lang="pt-BR" sz="900" b="1" dirty="0"/>
           </a:p>
@@ -8902,8 +8853,8 @@
         </p:nvSpPr>
         <p:spPr>
           <a:xfrm>
-            <a:off x="8592539" y="4785151"/>
-            <a:ext cx="577546" cy="200055"/>
+            <a:off x="8516244" y="4785151"/>
+            <a:ext cx="653841" cy="215444"/>
           </a:xfrm>
           <a:prstGeom prst="rect">
             <a:avLst/>
@@ -8917,22 +8868,22 @@
           <a:lstStyle/>
           <a:p>
             <a:r>
-              <a:rPr lang="pt-BR" sz="700" dirty="0" err="1"/>
+              <a:rPr lang="pt-BR" sz="800" dirty="0" err="1"/>
               <a:t>w</a:t>
             </a:r>
             <a:r>
-              <a:rPr lang="pt-BR" sz="700" dirty="0" err="1" smtClean="0"/>
+              <a:rPr lang="pt-BR" sz="800" dirty="0" err="1" smtClean="0"/>
               <a:t>te</a:t>
             </a:r>
             <a:r>
-              <a:rPr lang="pt-BR" sz="700" dirty="0" smtClean="0"/>
+              <a:rPr lang="pt-BR" sz="800" dirty="0" smtClean="0"/>
               <a:t> + </a:t>
             </a:r>
             <a:r>
-              <a:rPr lang="pt-BR" sz="700" dirty="0" err="1" smtClean="0"/>
+              <a:rPr lang="pt-BR" sz="800" dirty="0" err="1" smtClean="0"/>
               <a:t>wpe</a:t>
             </a:r>
-            <a:endParaRPr lang="pt-BR" sz="700" dirty="0"/>
+            <a:endParaRPr lang="pt-BR" sz="800" dirty="0"/>
           </a:p>
         </p:txBody>
       </p:sp>
@@ -8945,7 +8896,7 @@
         <p:spPr>
           <a:xfrm>
             <a:off x="4108260" y="38657"/>
-            <a:ext cx="1255468" cy="369332"/>
+            <a:ext cx="1255468" cy="400110"/>
           </a:xfrm>
           <a:prstGeom prst="rect">
             <a:avLst/>
@@ -8959,10 +8910,10 @@
           <a:lstStyle/>
           <a:p>
             <a:r>
-              <a:rPr lang="pt-BR" dirty="0" err="1" smtClean="0"/>
+              <a:rPr lang="pt-BR" sz="2000" dirty="0" err="1" smtClean="0"/>
               <a:t>nanoGPT</a:t>
             </a:r>
-            <a:endParaRPr lang="pt-BR" dirty="0"/>
+            <a:endParaRPr lang="pt-BR" sz="2000" dirty="0"/>
           </a:p>
         </p:txBody>
       </p:sp>
@@ -8975,7 +8926,7 @@
         <p:spPr>
           <a:xfrm>
             <a:off x="8976992" y="4043350"/>
-            <a:ext cx="169784" cy="200055"/>
+            <a:ext cx="169784" cy="215444"/>
           </a:xfrm>
           <a:prstGeom prst="rect">
             <a:avLst/>
@@ -8989,10 +8940,10 @@
           <a:lstStyle/>
           <a:p>
             <a:r>
-              <a:rPr lang="pt-BR" sz="700" dirty="0" smtClean="0"/>
+              <a:rPr lang="pt-BR" sz="800" dirty="0" smtClean="0"/>
               <a:t>x</a:t>
             </a:r>
-            <a:endParaRPr lang="pt-BR" sz="700" dirty="0"/>
+            <a:endParaRPr lang="pt-BR" sz="800" dirty="0"/>
           </a:p>
         </p:txBody>
       </p:sp>
@@ -9005,7 +8956,7 @@
         <p:spPr>
           <a:xfrm>
             <a:off x="9202379" y="3120756"/>
-            <a:ext cx="169784" cy="200055"/>
+            <a:ext cx="169784" cy="215444"/>
           </a:xfrm>
           <a:prstGeom prst="rect">
             <a:avLst/>
@@ -9019,10 +8970,10 @@
           <a:lstStyle/>
           <a:p>
             <a:r>
-              <a:rPr lang="pt-BR" sz="700" dirty="0" smtClean="0"/>
+              <a:rPr lang="pt-BR" sz="800" dirty="0" smtClean="0"/>
               <a:t>x</a:t>
             </a:r>
-            <a:endParaRPr lang="pt-BR" sz="700" dirty="0"/>
+            <a:endParaRPr lang="pt-BR" sz="800" dirty="0"/>
           </a:p>
         </p:txBody>
       </p:sp>
@@ -9035,7 +8986,7 @@
         <p:spPr>
           <a:xfrm>
             <a:off x="8773384" y="3135830"/>
-            <a:ext cx="411566" cy="200055"/>
+            <a:ext cx="411566" cy="215444"/>
           </a:xfrm>
           <a:prstGeom prst="rect">
             <a:avLst/>
@@ -9049,10 +9000,10 @@
           <a:lstStyle/>
           <a:p>
             <a:r>
-              <a:rPr lang="pt-BR" sz="700" dirty="0" err="1" smtClean="0"/>
+              <a:rPr lang="pt-BR" sz="800" dirty="0" err="1" smtClean="0"/>
               <a:t>attn</a:t>
             </a:r>
-            <a:endParaRPr lang="pt-BR" sz="700" dirty="0"/>
+            <a:endParaRPr lang="pt-BR" sz="800" dirty="0"/>
           </a:p>
         </p:txBody>
       </p:sp>
@@ -9065,7 +9016,7 @@
         <p:spPr>
           <a:xfrm>
             <a:off x="9036739" y="2654766"/>
-            <a:ext cx="741381" cy="200055"/>
+            <a:ext cx="741381" cy="338554"/>
           </a:xfrm>
           <a:prstGeom prst="rect">
             <a:avLst/>
@@ -9079,10 +9030,10 @@
           <a:lstStyle/>
           <a:p>
             <a:r>
-              <a:rPr lang="pt-BR" sz="700" dirty="0" err="1"/>
+              <a:rPr lang="pt-BR" sz="800" dirty="0" err="1"/>
               <a:t>hidden_states</a:t>
             </a:r>
-            <a:endParaRPr lang="pt-BR" sz="700" dirty="0"/>
+            <a:endParaRPr lang="pt-BR" sz="800" dirty="0"/>
           </a:p>
         </p:txBody>
       </p:sp>
@@ -9094,8 +9045,8 @@
         </p:nvSpPr>
         <p:spPr>
           <a:xfrm>
-            <a:off x="7881466" y="1811254"/>
-            <a:ext cx="1269284" cy="200055"/>
+            <a:off x="7732356" y="1811254"/>
+            <a:ext cx="1418394" cy="215444"/>
           </a:xfrm>
           <a:prstGeom prst="rect">
             <a:avLst/>
@@ -9109,10 +9060,10 @@
           <a:lstStyle/>
           <a:p>
             <a:r>
-              <a:rPr lang="pt-BR" sz="700" dirty="0" err="1"/>
+              <a:rPr lang="pt-BR" sz="800" dirty="0" err="1"/>
               <a:t>feed_forward_hidden_states</a:t>
             </a:r>
-            <a:endParaRPr lang="pt-BR" sz="700" dirty="0"/>
+            <a:endParaRPr lang="pt-BR" sz="800" dirty="0"/>
           </a:p>
         </p:txBody>
       </p:sp>
@@ -9124,8 +9075,8 @@
         </p:nvSpPr>
         <p:spPr>
           <a:xfrm>
-            <a:off x="8711674" y="763748"/>
-            <a:ext cx="364163" cy="307777"/>
+            <a:off x="8665216" y="763748"/>
+            <a:ext cx="410621" cy="215444"/>
           </a:xfrm>
           <a:prstGeom prst="rect">
             <a:avLst/>
@@ -9139,10 +9090,10 @@
           <a:lstStyle/>
           <a:p>
             <a:r>
-              <a:rPr lang="pt-BR" sz="700" dirty="0" err="1"/>
+              <a:rPr lang="pt-BR" sz="800" dirty="0" err="1"/>
               <a:t>logits</a:t>
             </a:r>
-            <a:endParaRPr lang="pt-BR" sz="700" dirty="0"/>
+            <a:endParaRPr lang="pt-BR" sz="800" dirty="0"/>
           </a:p>
         </p:txBody>
       </p:sp>
@@ -9155,7 +9106,7 @@
         <p:spPr>
           <a:xfrm>
             <a:off x="4371747" y="4108095"/>
-            <a:ext cx="169784" cy="200055"/>
+            <a:ext cx="169784" cy="215444"/>
           </a:xfrm>
           <a:prstGeom prst="rect">
             <a:avLst/>
@@ -9169,10 +9120,10 @@
           <a:lstStyle/>
           <a:p>
             <a:r>
-              <a:rPr lang="pt-BR" sz="700" dirty="0" smtClean="0"/>
+              <a:rPr lang="pt-BR" sz="800" dirty="0" smtClean="0"/>
               <a:t>q</a:t>
             </a:r>
-            <a:endParaRPr lang="pt-BR" sz="700" dirty="0"/>
+            <a:endParaRPr lang="pt-BR" sz="800" dirty="0"/>
           </a:p>
         </p:txBody>
       </p:sp>
@@ -9185,7 +9136,7 @@
         <p:spPr>
           <a:xfrm>
             <a:off x="5224707" y="4089626"/>
-            <a:ext cx="169784" cy="200055"/>
+            <a:ext cx="169784" cy="215444"/>
           </a:xfrm>
           <a:prstGeom prst="rect">
             <a:avLst/>
@@ -9199,10 +9150,10 @@
           <a:lstStyle/>
           <a:p>
             <a:r>
-              <a:rPr lang="pt-BR" sz="700" dirty="0" smtClean="0"/>
+              <a:rPr lang="pt-BR" sz="800" dirty="0" smtClean="0"/>
               <a:t>k</a:t>
             </a:r>
-            <a:endParaRPr lang="pt-BR" sz="700" dirty="0"/>
+            <a:endParaRPr lang="pt-BR" sz="800" dirty="0"/>
           </a:p>
         </p:txBody>
       </p:sp>
@@ -9215,7 +9166,7 @@
         <p:spPr>
           <a:xfrm>
             <a:off x="6020454" y="4096354"/>
-            <a:ext cx="169784" cy="200055"/>
+            <a:ext cx="169784" cy="215444"/>
           </a:xfrm>
           <a:prstGeom prst="rect">
             <a:avLst/>
@@ -9229,10 +9180,10 @@
           <a:lstStyle/>
           <a:p>
             <a:r>
-              <a:rPr lang="pt-BR" sz="700" dirty="0" smtClean="0"/>
+              <a:rPr lang="pt-BR" sz="800" dirty="0" smtClean="0"/>
               <a:t>v</a:t>
             </a:r>
-            <a:endParaRPr lang="pt-BR" sz="700" dirty="0"/>
+            <a:endParaRPr lang="pt-BR" sz="800" dirty="0"/>
           </a:p>
         </p:txBody>
       </p:sp>
@@ -9245,7 +9196,7 @@
         <p:spPr>
           <a:xfrm>
             <a:off x="5181201" y="3171200"/>
-            <a:ext cx="359405" cy="200055"/>
+            <a:ext cx="359405" cy="215444"/>
           </a:xfrm>
           <a:prstGeom prst="rect">
             <a:avLst/>
@@ -9259,10 +9210,10 @@
           <a:lstStyle/>
           <a:p>
             <a:r>
-              <a:rPr lang="pt-BR" sz="700" dirty="0" smtClean="0"/>
+              <a:rPr lang="pt-BR" sz="800" dirty="0" smtClean="0"/>
               <a:t>z 64</a:t>
             </a:r>
-            <a:endParaRPr lang="pt-BR" sz="700" dirty="0"/>
+            <a:endParaRPr lang="pt-BR" sz="800" dirty="0"/>
           </a:p>
         </p:txBody>
       </p:sp>
@@ -9275,7 +9226,7 @@
         <p:spPr>
           <a:xfrm>
             <a:off x="5145971" y="1763070"/>
-            <a:ext cx="411566" cy="200055"/>
+            <a:ext cx="411566" cy="215444"/>
           </a:xfrm>
           <a:prstGeom prst="rect">
             <a:avLst/>
@@ -9289,10 +9240,10 @@
           <a:lstStyle/>
           <a:p>
             <a:r>
-              <a:rPr lang="pt-BR" sz="700" dirty="0" err="1" smtClean="0"/>
+              <a:rPr lang="pt-BR" sz="800" dirty="0" err="1" smtClean="0"/>
               <a:t>attn</a:t>
             </a:r>
-            <a:endParaRPr lang="pt-BR" sz="700" dirty="0"/>
+            <a:endParaRPr lang="pt-BR" sz="800" dirty="0"/>
           </a:p>
         </p:txBody>
       </p:sp>
@@ -9305,7 +9256,7 @@
         <p:spPr>
           <a:xfrm>
             <a:off x="5143032" y="2696568"/>
-            <a:ext cx="417444" cy="200055"/>
+            <a:ext cx="417444" cy="215444"/>
           </a:xfrm>
           <a:prstGeom prst="rect">
             <a:avLst/>
@@ -9319,10 +9270,10 @@
           <a:lstStyle/>
           <a:p>
             <a:r>
-              <a:rPr lang="pt-BR" sz="700" dirty="0" smtClean="0"/>
+              <a:rPr lang="pt-BR" sz="800" dirty="0" smtClean="0"/>
               <a:t>z 384</a:t>
             </a:r>
-            <a:endParaRPr lang="pt-BR" sz="700" dirty="0"/>
+            <a:endParaRPr lang="pt-BR" sz="800" dirty="0"/>
           </a:p>
         </p:txBody>
       </p:sp>
@@ -9334,8 +9285,8 @@
         </p:nvSpPr>
         <p:spPr>
           <a:xfrm>
-            <a:off x="8665216" y="365512"/>
-            <a:ext cx="410622" cy="200055"/>
+            <a:off x="8606566" y="365512"/>
+            <a:ext cx="469272" cy="215444"/>
           </a:xfrm>
           <a:prstGeom prst="rect">
             <a:avLst/>
@@ -9349,10 +9300,10 @@
           <a:lstStyle/>
           <a:p>
             <a:r>
-              <a:rPr lang="pt-BR" sz="700" dirty="0" err="1"/>
+              <a:rPr lang="pt-BR" sz="800" dirty="0" err="1"/>
               <a:t>probs</a:t>
             </a:r>
-            <a:endParaRPr lang="pt-BR" sz="700" dirty="0"/>
+            <a:endParaRPr lang="pt-BR" sz="800" dirty="0"/>
           </a:p>
         </p:txBody>
       </p:sp>
@@ -9413,7 +9364,7 @@
         <p:spPr>
           <a:xfrm>
             <a:off x="8606566" y="116336"/>
-            <a:ext cx="2201105" cy="307777"/>
+            <a:ext cx="2538910" cy="338554"/>
           </a:xfrm>
           <a:prstGeom prst="rect">
             <a:avLst/>
@@ -9427,14 +9378,14 @@
           <a:lstStyle/>
           <a:p>
             <a:r>
-              <a:rPr lang="pt-BR" sz="700" dirty="0" err="1" smtClean="0"/>
+              <a:rPr lang="pt-BR" sz="800" dirty="0" err="1" smtClean="0"/>
               <a:t>Generate</a:t>
             </a:r>
-            <a:endParaRPr lang="pt-BR" sz="700" dirty="0" smtClean="0"/>
-          </a:p>
-          <a:p>
-            <a:r>
-              <a:rPr lang="pt-BR" sz="700" dirty="0" err="1" smtClean="0">
+            <a:endParaRPr lang="pt-BR" sz="800" dirty="0" smtClean="0"/>
+          </a:p>
+          <a:p>
+            <a:r>
+              <a:rPr lang="pt-BR" sz="800" dirty="0" err="1" smtClean="0">
                 <a:solidFill>
                   <a:schemeClr val="accent6">
                     <a:lumMod val="50000"/>
@@ -9444,7 +9395,7 @@
               <a:t>idx_next</a:t>
             </a:r>
             <a:r>
-              <a:rPr lang="pt-BR" sz="700" dirty="0" smtClean="0">
+              <a:rPr lang="pt-BR" sz="800" dirty="0" smtClean="0">
                 <a:solidFill>
                   <a:schemeClr val="accent6">
                     <a:lumMod val="50000"/>
@@ -9454,7 +9405,7 @@
               <a:t> </a:t>
             </a:r>
             <a:r>
-              <a:rPr lang="pt-BR" sz="700" dirty="0">
+              <a:rPr lang="pt-BR" sz="800" dirty="0">
                 <a:solidFill>
                   <a:schemeClr val="accent6">
                     <a:lumMod val="50000"/>
@@ -9464,7 +9415,7 @@
               <a:t>= </a:t>
             </a:r>
             <a:r>
-              <a:rPr lang="pt-BR" sz="700" dirty="0" err="1">
+              <a:rPr lang="pt-BR" sz="800" dirty="0" err="1">
                 <a:solidFill>
                   <a:schemeClr val="accent6">
                     <a:lumMod val="50000"/>
@@ -9474,7 +9425,7 @@
               <a:t>torch.multinomial</a:t>
             </a:r>
             <a:r>
-              <a:rPr lang="pt-BR" sz="700" dirty="0">
+              <a:rPr lang="pt-BR" sz="800" dirty="0">
                 <a:solidFill>
                   <a:schemeClr val="accent6">
                     <a:lumMod val="50000"/>
@@ -9484,7 +9435,7 @@
               <a:t>(</a:t>
             </a:r>
             <a:r>
-              <a:rPr lang="pt-BR" sz="700" dirty="0" err="1">
+              <a:rPr lang="pt-BR" sz="800" dirty="0" err="1">
                 <a:solidFill>
                   <a:schemeClr val="accent6">
                     <a:lumMod val="50000"/>
@@ -9494,7 +9445,7 @@
               <a:t>probs</a:t>
             </a:r>
             <a:r>
-              <a:rPr lang="pt-BR" sz="700" dirty="0">
+              <a:rPr lang="pt-BR" sz="800" dirty="0">
                 <a:solidFill>
                   <a:schemeClr val="accent6">
                     <a:lumMod val="50000"/>
@@ -9504,7 +9455,7 @@
               <a:t>, </a:t>
             </a:r>
             <a:r>
-              <a:rPr lang="pt-BR" sz="700" dirty="0" err="1" smtClean="0">
+              <a:rPr lang="pt-BR" sz="800" dirty="0" err="1" smtClean="0">
                 <a:solidFill>
                   <a:schemeClr val="accent6">
                     <a:lumMod val="50000"/>
@@ -9514,7 +9465,7 @@
               <a:t>num_samples</a:t>
             </a:r>
             <a:r>
-              <a:rPr lang="pt-BR" sz="700" dirty="0" smtClean="0">
+              <a:rPr lang="pt-BR" sz="800" dirty="0" smtClean="0">
                 <a:solidFill>
                   <a:schemeClr val="accent6">
                     <a:lumMod val="50000"/>
@@ -9523,7 +9474,7 @@
               </a:rPr>
               <a:t>=1)</a:t>
             </a:r>
-            <a:endParaRPr lang="pt-BR" sz="700" dirty="0">
+            <a:endParaRPr lang="pt-BR" sz="800" dirty="0">
               <a:solidFill>
                 <a:schemeClr val="accent6">
                   <a:lumMod val="50000"/>
@@ -9578,7 +9529,7 @@
         <p:spPr>
           <a:xfrm>
             <a:off x="2186840" y="3209135"/>
-            <a:ext cx="311891" cy="200055"/>
+            <a:ext cx="311891" cy="215444"/>
           </a:xfrm>
           <a:prstGeom prst="rect">
             <a:avLst/>
@@ -9592,10 +9543,10 @@
           <a:lstStyle/>
           <a:p>
             <a:r>
-              <a:rPr lang="pt-BR" sz="700" dirty="0" err="1" smtClean="0"/>
+              <a:rPr lang="pt-BR" sz="800" dirty="0" err="1" smtClean="0"/>
               <a:t>att</a:t>
             </a:r>
-            <a:endParaRPr lang="pt-BR" sz="700" dirty="0"/>
+            <a:endParaRPr lang="pt-BR" sz="800" dirty="0"/>
           </a:p>
         </p:txBody>
       </p:sp>
@@ -9869,7 +9820,7 @@
           <a:lstStyle/>
           <a:p>
             <a:pPr algn="ctr"/>
-            <a:endParaRPr lang="pt-BR"/>
+            <a:endParaRPr lang="pt-BR" sz="800"/>
           </a:p>
         </p:txBody>
       </p:sp>
@@ -9882,7 +9833,7 @@
         <p:spPr>
           <a:xfrm>
             <a:off x="1991896" y="5928319"/>
-            <a:ext cx="667152" cy="200055"/>
+            <a:ext cx="667152" cy="215444"/>
           </a:xfrm>
           <a:prstGeom prst="rect">
             <a:avLst/>
@@ -9896,26 +9847,26 @@
           <a:lstStyle/>
           <a:p>
             <a:r>
-              <a:rPr lang="pt-BR" sz="700" dirty="0"/>
+              <a:rPr lang="pt-BR" sz="800" dirty="0"/>
               <a:t>(B, </a:t>
             </a:r>
             <a:r>
-              <a:rPr lang="pt-BR" sz="700" dirty="0" smtClean="0"/>
+              <a:rPr lang="pt-BR" sz="800" dirty="0" smtClean="0"/>
               <a:t>h</a:t>
             </a:r>
             <a:r>
-              <a:rPr lang="pt-BR" sz="700" dirty="0"/>
+              <a:rPr lang="pt-BR" sz="800" dirty="0"/>
               <a:t>, T, </a:t>
             </a:r>
             <a:r>
-              <a:rPr lang="pt-BR" sz="700" dirty="0" err="1" smtClean="0"/>
+              <a:rPr lang="pt-BR" sz="800" dirty="0" err="1" smtClean="0"/>
               <a:t>hs</a:t>
             </a:r>
             <a:r>
-              <a:rPr lang="pt-BR" sz="700" dirty="0" smtClean="0"/>
+              <a:rPr lang="pt-BR" sz="800" dirty="0" smtClean="0"/>
               <a:t>)</a:t>
             </a:r>
-            <a:endParaRPr lang="pt-BR" sz="700" dirty="0"/>
+            <a:endParaRPr lang="pt-BR" sz="800" dirty="0"/>
           </a:p>
         </p:txBody>
       </p:sp>
@@ -9928,7 +9879,7 @@
         <p:spPr>
           <a:xfrm>
             <a:off x="5143032" y="1549157"/>
-            <a:ext cx="490677" cy="200055"/>
+            <a:ext cx="571011" cy="215444"/>
           </a:xfrm>
           <a:prstGeom prst="rect">
             <a:avLst/>
@@ -9942,22 +9893,22 @@
           <a:lstStyle/>
           <a:p>
             <a:r>
-              <a:rPr lang="pt-BR" sz="700" dirty="0"/>
+              <a:rPr lang="pt-BR" sz="800" dirty="0"/>
               <a:t>(B, </a:t>
             </a:r>
             <a:r>
-              <a:rPr lang="pt-BR" sz="700" dirty="0" smtClean="0"/>
+              <a:rPr lang="pt-BR" sz="800" dirty="0" smtClean="0"/>
               <a:t>T</a:t>
             </a:r>
             <a:r>
-              <a:rPr lang="pt-BR" sz="700" dirty="0"/>
+              <a:rPr lang="pt-BR" sz="800" dirty="0"/>
               <a:t>, </a:t>
             </a:r>
             <a:r>
-              <a:rPr lang="pt-BR" sz="700" dirty="0" smtClean="0"/>
+              <a:rPr lang="pt-BR" sz="800" dirty="0" smtClean="0"/>
               <a:t>C)</a:t>
             </a:r>
-            <a:endParaRPr lang="pt-BR" sz="700" dirty="0"/>
+            <a:endParaRPr lang="pt-BR" sz="800" dirty="0"/>
           </a:p>
         </p:txBody>
       </p:sp>
@@ -9970,7 +9921,7 @@
         <p:spPr>
           <a:xfrm>
             <a:off x="5479840" y="2701808"/>
-            <a:ext cx="490677" cy="200055"/>
+            <a:ext cx="551052" cy="215444"/>
           </a:xfrm>
           <a:prstGeom prst="rect">
             <a:avLst/>
@@ -9984,22 +9935,22 @@
           <a:lstStyle/>
           <a:p>
             <a:r>
-              <a:rPr lang="pt-BR" sz="700" dirty="0"/>
+              <a:rPr lang="pt-BR" sz="800" dirty="0"/>
               <a:t>(B, </a:t>
             </a:r>
             <a:r>
-              <a:rPr lang="pt-BR" sz="700" dirty="0" smtClean="0"/>
+              <a:rPr lang="pt-BR" sz="800" dirty="0" smtClean="0"/>
               <a:t>T</a:t>
             </a:r>
             <a:r>
-              <a:rPr lang="pt-BR" sz="700" dirty="0"/>
+              <a:rPr lang="pt-BR" sz="800" dirty="0"/>
               <a:t>, </a:t>
             </a:r>
             <a:r>
-              <a:rPr lang="pt-BR" sz="700" dirty="0" smtClean="0"/>
+              <a:rPr lang="pt-BR" sz="800" dirty="0" smtClean="0"/>
               <a:t>C)</a:t>
             </a:r>
-            <a:endParaRPr lang="pt-BR" sz="700" dirty="0"/>
+            <a:endParaRPr lang="pt-BR" sz="800" dirty="0"/>
           </a:p>
         </p:txBody>
       </p:sp>
@@ -10012,7 +9963,7 @@
         <p:spPr>
           <a:xfrm>
             <a:off x="5778937" y="3196461"/>
-            <a:ext cx="667152" cy="200055"/>
+            <a:ext cx="667152" cy="215444"/>
           </a:xfrm>
           <a:prstGeom prst="rect">
             <a:avLst/>
@@ -10026,26 +9977,26 @@
           <a:lstStyle/>
           <a:p>
             <a:r>
-              <a:rPr lang="pt-BR" sz="700" dirty="0"/>
+              <a:rPr lang="pt-BR" sz="800" dirty="0"/>
               <a:t>(B, </a:t>
             </a:r>
             <a:r>
-              <a:rPr lang="pt-BR" sz="700" dirty="0" smtClean="0"/>
+              <a:rPr lang="pt-BR" sz="800" dirty="0" smtClean="0"/>
               <a:t>h</a:t>
             </a:r>
             <a:r>
-              <a:rPr lang="pt-BR" sz="700" dirty="0"/>
+              <a:rPr lang="pt-BR" sz="800" dirty="0"/>
               <a:t>, T, </a:t>
             </a:r>
             <a:r>
-              <a:rPr lang="pt-BR" sz="700" dirty="0" err="1" smtClean="0"/>
+              <a:rPr lang="pt-BR" sz="800" dirty="0" err="1" smtClean="0"/>
               <a:t>hs</a:t>
             </a:r>
             <a:r>
-              <a:rPr lang="pt-BR" sz="700" dirty="0" smtClean="0"/>
+              <a:rPr lang="pt-BR" sz="800" dirty="0" smtClean="0"/>
               <a:t>)</a:t>
             </a:r>
-            <a:endParaRPr lang="pt-BR" sz="700" dirty="0"/>
+            <a:endParaRPr lang="pt-BR" sz="800" dirty="0"/>
           </a:p>
         </p:txBody>
       </p:sp>
@@ -10058,7 +10009,7 @@
         <p:spPr>
           <a:xfrm>
             <a:off x="5106415" y="5837436"/>
-            <a:ext cx="490677" cy="200055"/>
+            <a:ext cx="583887" cy="215444"/>
           </a:xfrm>
           <a:prstGeom prst="rect">
             <a:avLst/>
@@ -10072,22 +10023,22 @@
           <a:lstStyle/>
           <a:p>
             <a:r>
-              <a:rPr lang="pt-BR" sz="700" dirty="0"/>
+              <a:rPr lang="pt-BR" sz="800" dirty="0"/>
               <a:t>(B, </a:t>
             </a:r>
             <a:r>
-              <a:rPr lang="pt-BR" sz="700" dirty="0" smtClean="0"/>
+              <a:rPr lang="pt-BR" sz="800" dirty="0" smtClean="0"/>
               <a:t>T</a:t>
             </a:r>
             <a:r>
-              <a:rPr lang="pt-BR" sz="700" dirty="0"/>
+              <a:rPr lang="pt-BR" sz="800" dirty="0"/>
               <a:t>, </a:t>
             </a:r>
             <a:r>
-              <a:rPr lang="pt-BR" sz="700" dirty="0" smtClean="0"/>
+              <a:rPr lang="pt-BR" sz="800" dirty="0" smtClean="0"/>
               <a:t>C)</a:t>
             </a:r>
-            <a:endParaRPr lang="pt-BR" sz="700" dirty="0"/>
+            <a:endParaRPr lang="pt-BR" sz="800" dirty="0"/>
           </a:p>
         </p:txBody>
       </p:sp>
@@ -10099,8 +10050,8 @@
         </p:nvSpPr>
         <p:spPr>
           <a:xfrm>
-            <a:off x="9457197" y="4992257"/>
-            <a:ext cx="490677" cy="200055"/>
+            <a:off x="9372163" y="4992257"/>
+            <a:ext cx="575711" cy="215444"/>
           </a:xfrm>
           <a:prstGeom prst="rect">
             <a:avLst/>
@@ -10114,22 +10065,22 @@
           <a:lstStyle/>
           <a:p>
             <a:r>
-              <a:rPr lang="pt-BR" sz="700" dirty="0"/>
+              <a:rPr lang="pt-BR" sz="800" dirty="0"/>
               <a:t>(B, </a:t>
             </a:r>
             <a:r>
-              <a:rPr lang="pt-BR" sz="700" dirty="0" smtClean="0"/>
+              <a:rPr lang="pt-BR" sz="800" dirty="0" smtClean="0"/>
               <a:t>T</a:t>
             </a:r>
             <a:r>
-              <a:rPr lang="pt-BR" sz="700" dirty="0"/>
+              <a:rPr lang="pt-BR" sz="800" dirty="0"/>
               <a:t>, </a:t>
             </a:r>
             <a:r>
-              <a:rPr lang="pt-BR" sz="700" dirty="0" smtClean="0"/>
+              <a:rPr lang="pt-BR" sz="800" dirty="0" smtClean="0"/>
               <a:t>C)</a:t>
             </a:r>
-            <a:endParaRPr lang="pt-BR" sz="700" dirty="0"/>
+            <a:endParaRPr lang="pt-BR" sz="800" dirty="0"/>
           </a:p>
         </p:txBody>
       </p:sp>
@@ -10142,7 +10093,7 @@
         <p:spPr>
           <a:xfrm>
             <a:off x="8706270" y="5160338"/>
-            <a:ext cx="490677" cy="200055"/>
+            <a:ext cx="559388" cy="215444"/>
           </a:xfrm>
           <a:prstGeom prst="rect">
             <a:avLst/>
@@ -10156,22 +10107,22 @@
           <a:lstStyle/>
           <a:p>
             <a:r>
-              <a:rPr lang="pt-BR" sz="700" dirty="0"/>
+              <a:rPr lang="pt-BR" sz="800" dirty="0"/>
               <a:t>(B, </a:t>
             </a:r>
             <a:r>
-              <a:rPr lang="pt-BR" sz="700" dirty="0" smtClean="0"/>
+              <a:rPr lang="pt-BR" sz="800" dirty="0" smtClean="0"/>
               <a:t>T</a:t>
             </a:r>
             <a:r>
-              <a:rPr lang="pt-BR" sz="700" dirty="0"/>
+              <a:rPr lang="pt-BR" sz="800" dirty="0"/>
               <a:t>, </a:t>
             </a:r>
             <a:r>
-              <a:rPr lang="pt-BR" sz="700" dirty="0" smtClean="0"/>
+              <a:rPr lang="pt-BR" sz="800" dirty="0" smtClean="0"/>
               <a:t>C)</a:t>
             </a:r>
-            <a:endParaRPr lang="pt-BR" sz="700" dirty="0"/>
+            <a:endParaRPr lang="pt-BR" sz="800" dirty="0"/>
           </a:p>
         </p:txBody>
       </p:sp>
@@ -10184,7 +10135,7 @@
         <p:spPr>
           <a:xfrm>
             <a:off x="9081839" y="4067003"/>
-            <a:ext cx="490677" cy="200055"/>
+            <a:ext cx="576386" cy="215444"/>
           </a:xfrm>
           <a:prstGeom prst="rect">
             <a:avLst/>
@@ -10198,22 +10149,22 @@
           <a:lstStyle/>
           <a:p>
             <a:r>
-              <a:rPr lang="pt-BR" sz="700" dirty="0"/>
+              <a:rPr lang="pt-BR" sz="800" dirty="0"/>
               <a:t>(B, </a:t>
             </a:r>
             <a:r>
-              <a:rPr lang="pt-BR" sz="700" dirty="0" smtClean="0"/>
+              <a:rPr lang="pt-BR" sz="800" dirty="0" smtClean="0"/>
               <a:t>T</a:t>
             </a:r>
             <a:r>
-              <a:rPr lang="pt-BR" sz="700" dirty="0"/>
+              <a:rPr lang="pt-BR" sz="800" dirty="0"/>
               <a:t>, </a:t>
             </a:r>
             <a:r>
-              <a:rPr lang="pt-BR" sz="700" dirty="0" smtClean="0"/>
+              <a:rPr lang="pt-BR" sz="800" dirty="0" smtClean="0"/>
               <a:t>C)</a:t>
             </a:r>
-            <a:endParaRPr lang="pt-BR" sz="700" dirty="0"/>
+            <a:endParaRPr lang="pt-BR" sz="800" dirty="0"/>
           </a:p>
         </p:txBody>
       </p:sp>
@@ -10225,8 +10176,8 @@
         </p:nvSpPr>
         <p:spPr>
           <a:xfrm>
-            <a:off x="8631250" y="2662923"/>
-            <a:ext cx="490677" cy="200055"/>
+            <a:off x="8587370" y="2662923"/>
+            <a:ext cx="534557" cy="215444"/>
           </a:xfrm>
           <a:prstGeom prst="rect">
             <a:avLst/>
@@ -10240,22 +10191,22 @@
           <a:lstStyle/>
           <a:p>
             <a:r>
-              <a:rPr lang="pt-BR" sz="700" dirty="0"/>
+              <a:rPr lang="pt-BR" sz="800" dirty="0"/>
               <a:t>(B, </a:t>
             </a:r>
             <a:r>
-              <a:rPr lang="pt-BR" sz="700" dirty="0" smtClean="0"/>
+              <a:rPr lang="pt-BR" sz="800" dirty="0" smtClean="0"/>
               <a:t>T</a:t>
             </a:r>
             <a:r>
-              <a:rPr lang="pt-BR" sz="700" dirty="0"/>
+              <a:rPr lang="pt-BR" sz="800" dirty="0"/>
               <a:t>, </a:t>
             </a:r>
             <a:r>
-              <a:rPr lang="pt-BR" sz="700" dirty="0" smtClean="0"/>
+              <a:rPr lang="pt-BR" sz="800" dirty="0" smtClean="0"/>
               <a:t>C)</a:t>
             </a:r>
-            <a:endParaRPr lang="pt-BR" sz="700" dirty="0"/>
+            <a:endParaRPr lang="pt-BR" sz="800" dirty="0"/>
           </a:p>
         </p:txBody>
       </p:sp>
@@ -10268,7 +10219,7 @@
         <p:spPr>
           <a:xfrm>
             <a:off x="9054399" y="1823168"/>
-            <a:ext cx="490677" cy="200055"/>
+            <a:ext cx="522481" cy="215444"/>
           </a:xfrm>
           <a:prstGeom prst="rect">
             <a:avLst/>
@@ -10282,22 +10233,22 @@
           <a:lstStyle/>
           <a:p>
             <a:r>
-              <a:rPr lang="pt-BR" sz="700" dirty="0"/>
+              <a:rPr lang="pt-BR" sz="800" dirty="0"/>
               <a:t>(B, </a:t>
             </a:r>
             <a:r>
-              <a:rPr lang="pt-BR" sz="700" dirty="0" smtClean="0"/>
+              <a:rPr lang="pt-BR" sz="800" dirty="0" smtClean="0"/>
               <a:t>T</a:t>
             </a:r>
             <a:r>
-              <a:rPr lang="pt-BR" sz="700" dirty="0"/>
+              <a:rPr lang="pt-BR" sz="800" dirty="0"/>
               <a:t>, </a:t>
             </a:r>
             <a:r>
-              <a:rPr lang="pt-BR" sz="700" dirty="0" smtClean="0"/>
+              <a:rPr lang="pt-BR" sz="800" dirty="0" smtClean="0"/>
               <a:t>C)</a:t>
             </a:r>
-            <a:endParaRPr lang="pt-BR" sz="700" dirty="0"/>
+            <a:endParaRPr lang="pt-BR" sz="800" dirty="0"/>
           </a:p>
         </p:txBody>
       </p:sp>
@@ -10310,7 +10261,7 @@
         <p:spPr>
           <a:xfrm>
             <a:off x="9103964" y="754713"/>
-            <a:ext cx="841500" cy="200055"/>
+            <a:ext cx="965340" cy="215444"/>
           </a:xfrm>
           <a:prstGeom prst="rect">
             <a:avLst/>
@@ -10324,26 +10275,26 @@
           <a:lstStyle/>
           <a:p>
             <a:r>
-              <a:rPr lang="pt-BR" sz="700" dirty="0"/>
+              <a:rPr lang="pt-BR" sz="800" dirty="0"/>
               <a:t>(B, </a:t>
             </a:r>
             <a:r>
-              <a:rPr lang="pt-BR" sz="700" dirty="0" smtClean="0"/>
+              <a:rPr lang="pt-BR" sz="800" dirty="0" smtClean="0"/>
               <a:t>T</a:t>
             </a:r>
             <a:r>
-              <a:rPr lang="pt-BR" sz="700" dirty="0"/>
+              <a:rPr lang="pt-BR" sz="800" dirty="0"/>
               <a:t>, </a:t>
             </a:r>
             <a:r>
-              <a:rPr lang="pt-BR" sz="700" dirty="0" err="1"/>
+              <a:rPr lang="pt-BR" sz="800" dirty="0" err="1"/>
               <a:t>vocab_size</a:t>
             </a:r>
             <a:r>
-              <a:rPr lang="pt-BR" sz="700" dirty="0" smtClean="0"/>
+              <a:rPr lang="pt-BR" sz="800" dirty="0" smtClean="0"/>
               <a:t>)</a:t>
             </a:r>
-            <a:endParaRPr lang="pt-BR" sz="700" dirty="0"/>
+            <a:endParaRPr lang="pt-BR" sz="800" dirty="0"/>
           </a:p>
         </p:txBody>
       </p:sp>
@@ -10356,7 +10307,7 @@
         <p:spPr>
           <a:xfrm>
             <a:off x="9123466" y="373416"/>
-            <a:ext cx="728528" cy="200055"/>
+            <a:ext cx="821998" cy="215444"/>
           </a:xfrm>
           <a:prstGeom prst="rect">
             <a:avLst/>
@@ -10370,21 +10321,83 @@
           <a:lstStyle/>
           <a:p>
             <a:r>
-              <a:rPr lang="pt-BR" sz="700" dirty="0" smtClean="0"/>
+              <a:rPr lang="pt-BR" sz="800" dirty="0" smtClean="0"/>
               <a:t>(1, </a:t>
             </a:r>
             <a:r>
-              <a:rPr lang="pt-BR" sz="700" dirty="0" err="1"/>
+              <a:rPr lang="pt-BR" sz="800" dirty="0" err="1"/>
               <a:t>vocab_size</a:t>
             </a:r>
             <a:r>
-              <a:rPr lang="pt-BR" sz="700" dirty="0" smtClean="0"/>
+              <a:rPr lang="pt-BR" sz="800" dirty="0" smtClean="0"/>
               <a:t>)</a:t>
             </a:r>
-            <a:endParaRPr lang="pt-BR" sz="700" dirty="0"/>
-          </a:p>
-        </p:txBody>
-      </p:sp>
+            <a:endParaRPr lang="pt-BR" sz="800" dirty="0"/>
+          </a:p>
+        </p:txBody>
+      </p:sp>
+      <p:sp>
+        <p:nvSpPr>
+          <p:cNvPr id="3" name="CaixaDeTexto 2"/>
+          <p:cNvSpPr txBox="1"/>
+          <p:nvPr/>
+        </p:nvSpPr>
+        <p:spPr>
+          <a:xfrm>
+            <a:off x="8712343" y="6052061"/>
+            <a:ext cx="1019521" cy="261610"/>
+          </a:xfrm>
+          <a:prstGeom prst="rect">
+            <a:avLst/>
+          </a:prstGeom>
+          <a:noFill/>
+        </p:spPr>
+        <p:txBody>
+          <a:bodyPr wrap="square" rtlCol="0">
+            <a:spAutoFit/>
+          </a:bodyPr>
+          <a:lstStyle/>
+          <a:p>
+            <a:r>
+              <a:rPr lang="pt-BR" sz="1100" dirty="0"/>
+              <a:t>x</a:t>
+            </a:r>
+            <a:r>
+              <a:rPr lang="pt-BR" sz="1100" dirty="0" smtClean="0"/>
+              <a:t>1 ... xt-1  </a:t>
+            </a:r>
+            <a:r>
+              <a:rPr lang="pt-BR" sz="1100" dirty="0" err="1" smtClean="0"/>
+              <a:t>xt</a:t>
+            </a:r>
+            <a:endParaRPr lang="pt-BR" sz="1100" dirty="0"/>
+          </a:p>
+        </p:txBody>
+      </p:sp>
+      <p:pic>
+        <p:nvPicPr>
+          <p:cNvPr id="4" name="Imagem 3"/>
+          <p:cNvPicPr>
+            <a:picLocks noChangeAspect="1"/>
+          </p:cNvPicPr>
+          <p:nvPr/>
+        </p:nvPicPr>
+        <p:blipFill>
+          <a:blip r:embed="rId2"/>
+          <a:stretch>
+            <a:fillRect/>
+          </a:stretch>
+        </p:blipFill>
+        <p:spPr>
+          <a:xfrm>
+            <a:off x="9191697" y="-33341"/>
+            <a:ext cx="402731" cy="173481"/>
+          </a:xfrm>
+          <a:prstGeom prst="rect">
+            <a:avLst/>
+          </a:prstGeom>
+        </p:spPr>
+      </p:pic>
     </p:spTree>
     <p:extLst>
       <p:ext uri="{BB962C8B-B14F-4D97-AF65-F5344CB8AC3E}">

</xml_diff>

<commit_message>
Ajustes na figura nanoGPT_model.jpg
</commit_message>
<xml_diff>
--- a/GPT_model.pptx
+++ b/GPT_model.pptx
@@ -243,7 +243,7 @@
           <a:p>
             <a:fld id="{340F23B5-8C4B-48DD-BF6E-763AF153F3AE}" type="datetimeFigureOut">
               <a:rPr lang="pt-BR" smtClean="0"/>
-              <a:t>01/11/2023</a:t>
+              <a:t>14/11/2023</a:t>
             </a:fld>
             <a:endParaRPr lang="pt-BR"/>
           </a:p>
@@ -413,7 +413,7 @@
           <a:p>
             <a:fld id="{340F23B5-8C4B-48DD-BF6E-763AF153F3AE}" type="datetimeFigureOut">
               <a:rPr lang="pt-BR" smtClean="0"/>
-              <a:t>01/11/2023</a:t>
+              <a:t>14/11/2023</a:t>
             </a:fld>
             <a:endParaRPr lang="pt-BR"/>
           </a:p>
@@ -593,7 +593,7 @@
           <a:p>
             <a:fld id="{340F23B5-8C4B-48DD-BF6E-763AF153F3AE}" type="datetimeFigureOut">
               <a:rPr lang="pt-BR" smtClean="0"/>
-              <a:t>01/11/2023</a:t>
+              <a:t>14/11/2023</a:t>
             </a:fld>
             <a:endParaRPr lang="pt-BR"/>
           </a:p>
@@ -763,7 +763,7 @@
           <a:p>
             <a:fld id="{340F23B5-8C4B-48DD-BF6E-763AF153F3AE}" type="datetimeFigureOut">
               <a:rPr lang="pt-BR" smtClean="0"/>
-              <a:t>01/11/2023</a:t>
+              <a:t>14/11/2023</a:t>
             </a:fld>
             <a:endParaRPr lang="pt-BR"/>
           </a:p>
@@ -1009,7 +1009,7 @@
           <a:p>
             <a:fld id="{340F23B5-8C4B-48DD-BF6E-763AF153F3AE}" type="datetimeFigureOut">
               <a:rPr lang="pt-BR" smtClean="0"/>
-              <a:t>01/11/2023</a:t>
+              <a:t>14/11/2023</a:t>
             </a:fld>
             <a:endParaRPr lang="pt-BR"/>
           </a:p>
@@ -1241,7 +1241,7 @@
           <a:p>
             <a:fld id="{340F23B5-8C4B-48DD-BF6E-763AF153F3AE}" type="datetimeFigureOut">
               <a:rPr lang="pt-BR" smtClean="0"/>
-              <a:t>01/11/2023</a:t>
+              <a:t>14/11/2023</a:t>
             </a:fld>
             <a:endParaRPr lang="pt-BR"/>
           </a:p>
@@ -1608,7 +1608,7 @@
           <a:p>
             <a:fld id="{340F23B5-8C4B-48DD-BF6E-763AF153F3AE}" type="datetimeFigureOut">
               <a:rPr lang="pt-BR" smtClean="0"/>
-              <a:t>01/11/2023</a:t>
+              <a:t>14/11/2023</a:t>
             </a:fld>
             <a:endParaRPr lang="pt-BR"/>
           </a:p>
@@ -1726,7 +1726,7 @@
           <a:p>
             <a:fld id="{340F23B5-8C4B-48DD-BF6E-763AF153F3AE}" type="datetimeFigureOut">
               <a:rPr lang="pt-BR" smtClean="0"/>
-              <a:t>01/11/2023</a:t>
+              <a:t>14/11/2023</a:t>
             </a:fld>
             <a:endParaRPr lang="pt-BR"/>
           </a:p>
@@ -1821,7 +1821,7 @@
           <a:p>
             <a:fld id="{340F23B5-8C4B-48DD-BF6E-763AF153F3AE}" type="datetimeFigureOut">
               <a:rPr lang="pt-BR" smtClean="0"/>
-              <a:t>01/11/2023</a:t>
+              <a:t>14/11/2023</a:t>
             </a:fld>
             <a:endParaRPr lang="pt-BR"/>
           </a:p>
@@ -2098,7 +2098,7 @@
           <a:p>
             <a:fld id="{340F23B5-8C4B-48DD-BF6E-763AF153F3AE}" type="datetimeFigureOut">
               <a:rPr lang="pt-BR" smtClean="0"/>
-              <a:t>01/11/2023</a:t>
+              <a:t>14/11/2023</a:t>
             </a:fld>
             <a:endParaRPr lang="pt-BR"/>
           </a:p>
@@ -2351,7 +2351,7 @@
           <a:p>
             <a:fld id="{340F23B5-8C4B-48DD-BF6E-763AF153F3AE}" type="datetimeFigureOut">
               <a:rPr lang="pt-BR" smtClean="0"/>
-              <a:t>01/11/2023</a:t>
+              <a:t>14/11/2023</a:t>
             </a:fld>
             <a:endParaRPr lang="pt-BR"/>
           </a:p>
@@ -2564,7 +2564,7 @@
           <a:p>
             <a:fld id="{340F23B5-8C4B-48DD-BF6E-763AF153F3AE}" type="datetimeFigureOut">
               <a:rPr lang="pt-BR" smtClean="0"/>
-              <a:t>01/11/2023</a:t>
+              <a:t>14/11/2023</a:t>
             </a:fld>
             <a:endParaRPr lang="pt-BR"/>
           </a:p>
@@ -3816,7 +3816,7 @@
         </p:nvSpPr>
         <p:spPr>
           <a:xfrm>
-            <a:off x="8538896" y="2865735"/>
+            <a:off x="8529656" y="2790496"/>
             <a:ext cx="1163640" cy="192505"/>
           </a:xfrm>
           <a:prstGeom prst="rect">
@@ -3867,7 +3867,7 @@
         </p:nvSpPr>
         <p:spPr>
           <a:xfrm>
-            <a:off x="8713239" y="2855766"/>
+            <a:off x="8731268" y="2778520"/>
             <a:ext cx="760772" cy="215444"/>
           </a:xfrm>
           <a:prstGeom prst="rect">
@@ -4024,9 +4024,9 @@
           <p:nvPr/>
         </p:nvCxnSpPr>
         <p:spPr>
-          <a:xfrm flipH="1" flipV="1">
-            <a:off x="9056889" y="2497943"/>
-            <a:ext cx="1" cy="378000"/>
+          <a:xfrm rot="-180000" flipV="1">
+            <a:off x="9110808" y="2505298"/>
+            <a:ext cx="10521" cy="289622"/>
           </a:xfrm>
           <a:prstGeom prst="straightConnector1">
             <a:avLst/>
@@ -4061,8 +4061,8 @@
         </p:nvSpPr>
         <p:spPr>
           <a:xfrm>
-            <a:off x="9047819" y="1743778"/>
-            <a:ext cx="832249" cy="915082"/>
+            <a:off x="9107061" y="1743779"/>
+            <a:ext cx="773007" cy="1322348"/>
           </a:xfrm>
           <a:custGeom>
             <a:avLst/>
@@ -4185,7 +4185,7 @@
         </p:nvCxnSpPr>
         <p:spPr>
           <a:xfrm rot="-180000" flipV="1">
-            <a:off x="9079036" y="3215746"/>
+            <a:off x="9094651" y="3215124"/>
             <a:ext cx="6138" cy="122400"/>
           </a:xfrm>
           <a:prstGeom prst="line">
@@ -7646,7 +7646,7 @@
         </p:nvSpPr>
         <p:spPr>
           <a:xfrm>
-            <a:off x="9026996" y="3120979"/>
+            <a:off x="9042530" y="3116428"/>
             <a:ext cx="113025" cy="88016"/>
           </a:xfrm>
           <a:prstGeom prst="flowChartOr">
@@ -7775,9 +7775,9 @@
           <p:nvPr/>
         </p:nvCxnSpPr>
         <p:spPr>
-          <a:xfrm flipH="1" flipV="1">
-            <a:off x="9083215" y="3073044"/>
-            <a:ext cx="1046" cy="43200"/>
+          <a:xfrm rot="-420000" flipV="1">
+            <a:off x="9099043" y="2977084"/>
+            <a:ext cx="15651" cy="139344"/>
           </a:xfrm>
           <a:prstGeom prst="line">
             <a:avLst/>
@@ -7896,7 +7896,7 @@
         </p:nvSpPr>
         <p:spPr>
           <a:xfrm>
-            <a:off x="8522085" y="4223526"/>
+            <a:off x="8517919" y="4139719"/>
             <a:ext cx="1187115" cy="192505"/>
           </a:xfrm>
           <a:prstGeom prst="rect">
@@ -7947,7 +7947,7 @@
         </p:nvSpPr>
         <p:spPr>
           <a:xfrm>
-            <a:off x="8785757" y="4217228"/>
+            <a:off x="8821993" y="4110388"/>
             <a:ext cx="760772" cy="215444"/>
           </a:xfrm>
           <a:prstGeom prst="rect">
@@ -7977,7 +7977,7 @@
         </p:nvSpPr>
         <p:spPr>
           <a:xfrm>
-            <a:off x="8549660" y="4573603"/>
+            <a:off x="8532873" y="4625059"/>
             <a:ext cx="1187115" cy="192505"/>
           </a:xfrm>
           <a:prstGeom prst="rect">
@@ -8028,7 +8028,7 @@
         </p:nvSpPr>
         <p:spPr>
           <a:xfrm>
-            <a:off x="8864479" y="4554528"/>
+            <a:off x="8850486" y="4605939"/>
             <a:ext cx="760772" cy="215444"/>
           </a:xfrm>
           <a:prstGeom prst="rect">
@@ -8664,7 +8664,7 @@
         </p:nvSpPr>
         <p:spPr>
           <a:xfrm>
-            <a:off x="8976992" y="4043350"/>
+            <a:off x="8952262" y="4310976"/>
             <a:ext cx="169784" cy="215444"/>
           </a:xfrm>
           <a:prstGeom prst="rect">
@@ -8724,7 +8724,7 @@
         </p:nvSpPr>
         <p:spPr>
           <a:xfrm>
-            <a:off x="8773384" y="3135830"/>
+            <a:off x="8702770" y="3116791"/>
             <a:ext cx="411566" cy="215444"/>
           </a:xfrm>
           <a:prstGeom prst="rect">
@@ -8754,8 +8754,8 @@
         </p:nvSpPr>
         <p:spPr>
           <a:xfrm>
-            <a:off x="9036739" y="2654766"/>
-            <a:ext cx="741381" cy="338554"/>
+            <a:off x="9129681" y="2559817"/>
+            <a:ext cx="791666" cy="215444"/>
           </a:xfrm>
           <a:prstGeom prst="rect">
             <a:avLst/>
@@ -9088,11 +9088,7 @@
           <a:p>
             <a:r>
               <a:rPr lang="pt-BR" sz="800" b="1" dirty="0" smtClean="0"/>
-              <a:t>           </a:t>
-            </a:r>
-            <a:r>
-              <a:rPr lang="pt-BR" sz="800" b="1" dirty="0" smtClean="0"/>
-              <a:t>    </a:t>
+              <a:t>               </a:t>
             </a:r>
             <a:r>
               <a:rPr lang="pt-BR" sz="800" b="1" dirty="0" err="1" smtClean="0"/>
@@ -9852,8 +9848,8 @@
         </p:nvSpPr>
         <p:spPr>
           <a:xfrm>
-            <a:off x="9081839" y="4067003"/>
-            <a:ext cx="576386" cy="215444"/>
+            <a:off x="8527662" y="4310447"/>
+            <a:ext cx="497422" cy="215444"/>
           </a:xfrm>
           <a:prstGeom prst="rect">
             <a:avLst/>
@@ -9894,7 +9890,7 @@
         </p:nvSpPr>
         <p:spPr>
           <a:xfrm>
-            <a:off x="8587370" y="2662923"/>
+            <a:off x="8593918" y="2552113"/>
             <a:ext cx="534557" cy="215444"/>
           </a:xfrm>
           <a:prstGeom prst="rect">
@@ -10174,8 +10170,8 @@
         </p:nvSpPr>
         <p:spPr>
           <a:xfrm>
-            <a:off x="9130331" y="3163828"/>
-            <a:ext cx="747370" cy="932526"/>
+            <a:off x="9145775" y="3156891"/>
+            <a:ext cx="736435" cy="1266017"/>
           </a:xfrm>
           <a:custGeom>
             <a:avLst/>
@@ -10784,11 +10780,7 @@
           <a:p>
             <a:r>
               <a:rPr lang="pt-BR" sz="800" i="1" dirty="0" smtClean="0"/>
-              <a:t>Camadas </a:t>
-            </a:r>
-            <a:r>
-              <a:rPr lang="pt-BR" sz="800" i="1" dirty="0" smtClean="0"/>
-              <a:t>removidas durante a inferência</a:t>
+              <a:t>Camadas removidas durante a inferência</a:t>
             </a:r>
             <a:endParaRPr lang="pt-BR" sz="800" i="1" dirty="0"/>
           </a:p>

</xml_diff>

<commit_message>
Alterado cor da camada de normalização
</commit_message>
<xml_diff>
--- a/GPT_model.pptx
+++ b/GPT_model.pptx
@@ -243,7 +243,7 @@
           <a:p>
             <a:fld id="{340F23B5-8C4B-48DD-BF6E-763AF153F3AE}" type="datetimeFigureOut">
               <a:rPr lang="pt-BR" smtClean="0"/>
-              <a:t>14/11/2023</a:t>
+              <a:t>02/05/2024</a:t>
             </a:fld>
             <a:endParaRPr lang="pt-BR"/>
           </a:p>
@@ -413,7 +413,7 @@
           <a:p>
             <a:fld id="{340F23B5-8C4B-48DD-BF6E-763AF153F3AE}" type="datetimeFigureOut">
               <a:rPr lang="pt-BR" smtClean="0"/>
-              <a:t>14/11/2023</a:t>
+              <a:t>02/05/2024</a:t>
             </a:fld>
             <a:endParaRPr lang="pt-BR"/>
           </a:p>
@@ -593,7 +593,7 @@
           <a:p>
             <a:fld id="{340F23B5-8C4B-48DD-BF6E-763AF153F3AE}" type="datetimeFigureOut">
               <a:rPr lang="pt-BR" smtClean="0"/>
-              <a:t>14/11/2023</a:t>
+              <a:t>02/05/2024</a:t>
             </a:fld>
             <a:endParaRPr lang="pt-BR"/>
           </a:p>
@@ -763,7 +763,7 @@
           <a:p>
             <a:fld id="{340F23B5-8C4B-48DD-BF6E-763AF153F3AE}" type="datetimeFigureOut">
               <a:rPr lang="pt-BR" smtClean="0"/>
-              <a:t>14/11/2023</a:t>
+              <a:t>02/05/2024</a:t>
             </a:fld>
             <a:endParaRPr lang="pt-BR"/>
           </a:p>
@@ -1009,7 +1009,7 @@
           <a:p>
             <a:fld id="{340F23B5-8C4B-48DD-BF6E-763AF153F3AE}" type="datetimeFigureOut">
               <a:rPr lang="pt-BR" smtClean="0"/>
-              <a:t>14/11/2023</a:t>
+              <a:t>02/05/2024</a:t>
             </a:fld>
             <a:endParaRPr lang="pt-BR"/>
           </a:p>
@@ -1241,7 +1241,7 @@
           <a:p>
             <a:fld id="{340F23B5-8C4B-48DD-BF6E-763AF153F3AE}" type="datetimeFigureOut">
               <a:rPr lang="pt-BR" smtClean="0"/>
-              <a:t>14/11/2023</a:t>
+              <a:t>02/05/2024</a:t>
             </a:fld>
             <a:endParaRPr lang="pt-BR"/>
           </a:p>
@@ -1608,7 +1608,7 @@
           <a:p>
             <a:fld id="{340F23B5-8C4B-48DD-BF6E-763AF153F3AE}" type="datetimeFigureOut">
               <a:rPr lang="pt-BR" smtClean="0"/>
-              <a:t>14/11/2023</a:t>
+              <a:t>02/05/2024</a:t>
             </a:fld>
             <a:endParaRPr lang="pt-BR"/>
           </a:p>
@@ -1726,7 +1726,7 @@
           <a:p>
             <a:fld id="{340F23B5-8C4B-48DD-BF6E-763AF153F3AE}" type="datetimeFigureOut">
               <a:rPr lang="pt-BR" smtClean="0"/>
-              <a:t>14/11/2023</a:t>
+              <a:t>02/05/2024</a:t>
             </a:fld>
             <a:endParaRPr lang="pt-BR"/>
           </a:p>
@@ -1821,7 +1821,7 @@
           <a:p>
             <a:fld id="{340F23B5-8C4B-48DD-BF6E-763AF153F3AE}" type="datetimeFigureOut">
               <a:rPr lang="pt-BR" smtClean="0"/>
-              <a:t>14/11/2023</a:t>
+              <a:t>02/05/2024</a:t>
             </a:fld>
             <a:endParaRPr lang="pt-BR"/>
           </a:p>
@@ -2098,7 +2098,7 @@
           <a:p>
             <a:fld id="{340F23B5-8C4B-48DD-BF6E-763AF153F3AE}" type="datetimeFigureOut">
               <a:rPr lang="pt-BR" smtClean="0"/>
-              <a:t>14/11/2023</a:t>
+              <a:t>02/05/2024</a:t>
             </a:fld>
             <a:endParaRPr lang="pt-BR"/>
           </a:p>
@@ -2351,7 +2351,7 @@
           <a:p>
             <a:fld id="{340F23B5-8C4B-48DD-BF6E-763AF153F3AE}" type="datetimeFigureOut">
               <a:rPr lang="pt-BR" smtClean="0"/>
-              <a:t>14/11/2023</a:t>
+              <a:t>02/05/2024</a:t>
             </a:fld>
             <a:endParaRPr lang="pt-BR"/>
           </a:p>
@@ -2564,7 +2564,7 @@
           <a:p>
             <a:fld id="{340F23B5-8C4B-48DD-BF6E-763AF153F3AE}" type="datetimeFigureOut">
               <a:rPr lang="pt-BR" smtClean="0"/>
-              <a:t>14/11/2023</a:t>
+              <a:t>02/05/2024</a:t>
             </a:fld>
             <a:endParaRPr lang="pt-BR"/>
           </a:p>
@@ -3043,10 +3043,7 @@
             <a:avLst/>
           </a:prstGeom>
           <a:solidFill>
-            <a:schemeClr val="accent4">
-              <a:lumMod val="20000"/>
-              <a:lumOff val="80000"/>
-            </a:schemeClr>
+            <a:srgbClr val="DEEBF7"/>
           </a:solidFill>
           <a:ln>
             <a:solidFill>
@@ -3823,10 +3820,7 @@
             <a:avLst/>
           </a:prstGeom>
           <a:solidFill>
-            <a:schemeClr val="accent4">
-              <a:lumMod val="20000"/>
-              <a:lumOff val="80000"/>
-            </a:schemeClr>
+            <a:srgbClr val="DEEBF7"/>
           </a:solidFill>
           <a:ln>
             <a:solidFill>
@@ -7903,10 +7897,7 @@
             <a:avLst/>
           </a:prstGeom>
           <a:solidFill>
-            <a:schemeClr val="accent4">
-              <a:lumMod val="20000"/>
-              <a:lumOff val="80000"/>
-            </a:schemeClr>
+            <a:srgbClr val="DEEBF7"/>
           </a:solidFill>
           <a:ln>
             <a:solidFill>
@@ -10780,7 +10771,15 @@
           <a:p>
             <a:r>
               <a:rPr lang="pt-BR" sz="800" i="1" dirty="0" smtClean="0"/>
-              <a:t>Camadas removidas durante a inferência</a:t>
+              <a:t>Camadas removidas durante a </a:t>
+            </a:r>
+            <a:r>
+              <a:rPr lang="pt-BR" sz="800" i="1" dirty="0" smtClean="0"/>
+              <a:t>inferência + </a:t>
+            </a:r>
+            <a:r>
+              <a:rPr lang="pt-BR" sz="800" i="1" dirty="0" err="1" smtClean="0"/>
+              <a:t>LayerNorm</a:t>
             </a:r>
             <a:endParaRPr lang="pt-BR" sz="800" i="1" dirty="0"/>
           </a:p>

</xml_diff>